<commit_message>
Auto bot updater CDS BTP Course
</commit_message>
<xml_diff>
--- a/Day 10/Day 10.pptx
+++ b/Day 10/Day 10.pptx
@@ -18059,7 +18059,7 @@
         <p:spPr>
           <a:xfrm>
             <a:off x="5158308" y="1484784"/>
-            <a:ext cx="5472608" cy="1477328"/>
+            <a:ext cx="5472608" cy="3416320"/>
           </a:xfrm>
           <a:prstGeom prst="rect">
             <a:avLst/>
@@ -18112,6 +18112,72 @@
             </a:r>
           </a:p>
           <a:p>
+            <a:r>
+              <a:rPr lang="en-US" sz="1800" dirty="0"/>
+              <a:t>---break</a:t>
+            </a:r>
+          </a:p>
+          <a:p>
+            <a:pPr marL="285750" indent="-285750">
+              <a:buFont typeface="Arial" panose="020B0604020202020204" pitchFamily="34" charset="0"/>
+              <a:buChar char="•"/>
+            </a:pPr>
+            <a:r>
+              <a:rPr lang="en-US" sz="1800" dirty="0"/>
+              <a:t>Analytic use case</a:t>
+            </a:r>
+          </a:p>
+          <a:p>
+            <a:pPr marL="285750" indent="-285750">
+              <a:buFont typeface="Arial" panose="020B0604020202020204" pitchFamily="34" charset="0"/>
+              <a:buChar char="•"/>
+            </a:pPr>
+            <a:r>
+              <a:rPr lang="en-US" sz="1800" dirty="0"/>
+              <a:t>Developing the Analytic Interface Views</a:t>
+            </a:r>
+          </a:p>
+          <a:p>
+            <a:pPr marL="285750" indent="-285750">
+              <a:buFont typeface="Arial" panose="020B0604020202020204" pitchFamily="34" charset="0"/>
+              <a:buChar char="•"/>
+            </a:pPr>
+            <a:r>
+              <a:rPr lang="en-US" sz="1800" dirty="0"/>
+              <a:t>Developing Consumption Views</a:t>
+            </a:r>
+          </a:p>
+          <a:p>
+            <a:pPr marL="285750" indent="-285750">
+              <a:buFont typeface="Arial" panose="020B0604020202020204" pitchFamily="34" charset="0"/>
+              <a:buChar char="•"/>
+            </a:pPr>
+            <a:r>
+              <a:rPr lang="en-US" sz="1800" dirty="0"/>
+              <a:t>Expose Service</a:t>
+            </a:r>
+          </a:p>
+          <a:p>
+            <a:r>
+              <a:rPr lang="en-US" sz="1800" dirty="0"/>
+              <a:t>--break</a:t>
+            </a:r>
+          </a:p>
+          <a:p>
+            <a:pPr marL="285750" indent="-285750">
+              <a:buFont typeface="Arial" panose="020B0604020202020204" pitchFamily="34" charset="0"/>
+              <a:buChar char="•"/>
+            </a:pPr>
+            <a:r>
+              <a:rPr lang="en-US" sz="1800" dirty="0"/>
+              <a:t>Create Analytic List Report Application</a:t>
+            </a:r>
+          </a:p>
+          <a:p>
+            <a:pPr marL="285750" indent="-285750">
+              <a:buFont typeface="Arial" panose="020B0604020202020204" pitchFamily="34" charset="0"/>
+              <a:buChar char="•"/>
+            </a:pPr>
             <a:endParaRPr lang="en-US" sz="1800" dirty="0"/>
           </a:p>
         </p:txBody>
@@ -20826,7 +20892,7 @@
                 <a:effectLst/>
                 <a:latin typeface="Cooper Black" panose="0208090404030B020404" pitchFamily="18" charset="0"/>
               </a:rPr>
-              <a:t>Title</a:t>
+              <a:t>Scope for Analytics Development</a:t>
             </a:r>
             <a:endParaRPr lang="en-US" sz="3200" b="1" dirty="0">
               <a:solidFill>
@@ -20965,6 +21031,35 @@
           </a:p>
         </p:txBody>
       </p:sp>
+      <p:pic>
+        <p:nvPicPr>
+          <p:cNvPr id="6" name="Picture 5">
+            <a:extLst>
+              <a:ext uri="{FF2B5EF4-FFF2-40B4-BE49-F238E27FC236}">
+                <a16:creationId xmlns:a16="http://schemas.microsoft.com/office/drawing/2014/main" id="{D4ACA2B1-CBB2-D607-CE3E-C598D39CB2F2}"/>
+              </a:ext>
+            </a:extLst>
+          </p:cNvPr>
+          <p:cNvPicPr>
+            <a:picLocks noChangeAspect="1"/>
+          </p:cNvPicPr>
+          <p:nvPr/>
+        </p:nvPicPr>
+        <p:blipFill rotWithShape="1">
+          <a:blip r:embed="rId4"/>
+          <a:srcRect t="1324"/>
+          <a:stretch/>
+        </p:blipFill>
+        <p:spPr>
+          <a:xfrm>
+            <a:off x="261764" y="794868"/>
+            <a:ext cx="11386135" cy="5363871"/>
+          </a:xfrm>
+          <a:prstGeom prst="rect">
+            <a:avLst/>
+          </a:prstGeom>
+        </p:spPr>
+      </p:pic>
     </p:spTree>
     <p:extLst>
       <p:ext uri="{BB962C8B-B14F-4D97-AF65-F5344CB8AC3E}">

</xml_diff>